<commit_message>
variables updated according to dataset
</commit_message>
<xml_diff>
--- a/Research question/Ds115 Team Research.pptx
+++ b/Research question/Ds115 Team Research.pptx
@@ -247,7 +247,7 @@
             <a:fld id="{93FAAC3A-BD1F-4A00-9099-74B95789FE00}" type="datetimeFigureOut">
               <a:rPr lang="en-GB" smtClean="0"/>
               <a:pPr/>
-              <a:t>18/11/2024</a:t>
+              <a:t>22/11/2024</a:t>
             </a:fld>
             <a:endParaRPr lang="en-GB"/>
           </a:p>
@@ -426,7 +426,7 @@
             <a:fld id="{8E359C8A-39F6-4045-9163-4042C4C26B15}" type="datetimeFigureOut">
               <a:rPr lang="en-GB" smtClean="0"/>
               <a:pPr/>
-              <a:t>18/11/2024</a:t>
+              <a:t>22/11/2024</a:t>
             </a:fld>
             <a:endParaRPr lang="en-GB"/>
           </a:p>
@@ -5039,34 +5039,17 @@
                 <a:latin typeface="Calibri"/>
                 <a:cs typeface="Calibri"/>
               </a:rPr>
-              <a:t>Our  Independent variable is: </a:t>
-            </a:r>
-            <a:r>
-              <a:rPr lang="en-US" sz="2400" b="0" dirty="0">
-                <a:solidFill>
-                  <a:schemeClr val="accent2">
-                    <a:lumMod val="76000"/>
-                  </a:schemeClr>
-                </a:solidFill>
+              <a:t>Our  Independent variable is</a:t>
+            </a:r>
+            <a:r>
+              <a:rPr lang="en-US" sz="2400" b="0">
                 <a:latin typeface="Calibri"/>
                 <a:cs typeface="Calibri"/>
               </a:rPr>
-              <a:t>Flight</a:t>
-            </a:r>
-            <a:r>
-              <a:rPr lang="en-US" sz="2400" dirty="0">
-                <a:solidFill>
-                  <a:schemeClr val="accent2">
-                    <a:lumMod val="76000"/>
-                  </a:schemeClr>
-                </a:solidFill>
-                <a:latin typeface="Calibri"/>
-                <a:cs typeface="Calibri"/>
-              </a:rPr>
-              <a:t> </a:t>
-            </a:r>
-            <a:r>
-              <a:rPr lang="en-US" sz="2400" b="0" dirty="0">
+              <a:t>: </a:t>
+            </a:r>
+            <a:r>
+              <a:rPr lang="en-US" sz="2400" b="0">
                 <a:solidFill>
                   <a:schemeClr val="accent2">
                     <a:lumMod val="76000"/>
@@ -5134,10 +5117,17 @@
                 <a:latin typeface="Calibri"/>
                 <a:cs typeface="Calibri"/>
               </a:rPr>
-              <a:t> Dependent variable is: </a:t>
-            </a:r>
-            <a:r>
-              <a:rPr lang="en-US" sz="2400" b="0" dirty="0">
+              <a:t> Dependent variable is</a:t>
+            </a:r>
+            <a:r>
+              <a:rPr lang="en-US" sz="2400" b="0">
+                <a:latin typeface="Calibri"/>
+                <a:cs typeface="Calibri"/>
+              </a:rPr>
+              <a:t>: </a:t>
+            </a:r>
+            <a:r>
+              <a:rPr lang="en-US" sz="2400" b="0">
                 <a:solidFill>
                   <a:schemeClr val="accent2">
                     <a:lumMod val="76000"/>
@@ -5146,7 +5136,19 @@
                 <a:latin typeface="Calibri"/>
                 <a:cs typeface="Calibri"/>
               </a:rPr>
-              <a:t>Ticket Price</a:t>
+              <a:t> </a:t>
+            </a:r>
+            <a:r>
+              <a:rPr lang="en-US" sz="2400" b="0" dirty="0">
+                <a:solidFill>
+                  <a:schemeClr val="accent2">
+                    <a:lumMod val="76000"/>
+                  </a:schemeClr>
+                </a:solidFill>
+                <a:latin typeface="Calibri"/>
+                <a:cs typeface="Calibri"/>
+              </a:rPr>
+              <a:t>Price</a:t>
             </a:r>
             <a:br>
               <a:rPr lang="en-US" sz="2400" b="0" dirty="0">
@@ -7115,20 +7117,20 @@
 </file>
 
 <file path=customXml/item2.xml><?xml version="1.0" encoding="utf-8"?>
-<p:properties xmlns:p="http://schemas.microsoft.com/office/2006/metadata/properties" xmlns:xsi="http://www.w3.org/2001/XMLSchema-instance" xmlns:pc="http://schemas.microsoft.com/office/infopath/2007/PartnerControls">
-  <documentManagement>
-    <_activity xmlns="e0b66e2b-8ac0-4af7-b642-ec91160566fb" xsi:nil="true"/>
-  </documentManagement>
-</p:properties>
-</file>
-
-<file path=customXml/item3.xml><?xml version="1.0" encoding="utf-8"?>
 <?mso-contentType ?>
 <FormTemplates xmlns="http://schemas.microsoft.com/sharepoint/v3/contenttype/forms">
   <Display>DocumentLibraryForm</Display>
   <Edit>DocumentLibraryForm</Edit>
   <New>DocumentLibraryForm</New>
 </FormTemplates>
+</file>
+
+<file path=customXml/item3.xml><?xml version="1.0" encoding="utf-8"?>
+<p:properties xmlns:p="http://schemas.microsoft.com/office/2006/metadata/properties" xmlns:xsi="http://www.w3.org/2001/XMLSchema-instance" xmlns:pc="http://schemas.microsoft.com/office/infopath/2007/PartnerControls">
+  <documentManagement>
+    <_activity xmlns="e0b66e2b-8ac0-4af7-b642-ec91160566fb" xsi:nil="true"/>
+  </documentManagement>
+</p:properties>
 </file>
 
 <file path=customXml/itemProps1.xml><?xml version="1.0" encoding="utf-8"?>
@@ -7150,6 +7152,14 @@
 </file>
 
 <file path=customXml/itemProps2.xml><?xml version="1.0" encoding="utf-8"?>
+<ds:datastoreItem xmlns:ds="http://schemas.openxmlformats.org/officeDocument/2006/customXml" ds:itemID="{91C521DD-2673-4EE6-BB9B-DC5C3320FFBB}">
+  <ds:schemaRefs>
+    <ds:schemaRef ds:uri="http://schemas.microsoft.com/sharepoint/v3/contenttype/forms"/>
+  </ds:schemaRefs>
+</ds:datastoreItem>
+</file>
+
+<file path=customXml/itemProps3.xml><?xml version="1.0" encoding="utf-8"?>
 <ds:datastoreItem xmlns:ds="http://schemas.openxmlformats.org/officeDocument/2006/customXml" ds:itemID="{EDD1FC41-23C7-41B0-B5F9-BF4CD38AD2ED}">
   <ds:schemaRefs>
     <ds:schemaRef ds:uri="http://schemas.microsoft.com/office/infopath/2007/PartnerControls"/>
@@ -7163,12 +7173,4 @@
     <ds:schemaRef ds:uri="http://www.w3.org/XML/1998/namespace"/>
   </ds:schemaRefs>
 </ds:datastoreItem>
-</file>
-
-<file path=customXml/itemProps3.xml><?xml version="1.0" encoding="utf-8"?>
-<ds:datastoreItem xmlns:ds="http://schemas.openxmlformats.org/officeDocument/2006/customXml" ds:itemID="{91C521DD-2673-4EE6-BB9B-DC5C3320FFBB}">
-  <ds:schemaRefs>
-    <ds:schemaRef ds:uri="http://schemas.microsoft.com/sharepoint/v3/contenttype/forms"/>
-  </ds:schemaRefs>
-</ds:datastoreItem>
 </file>
</xml_diff>

<commit_message>
updated RQ, removed departing city from the q to cover all dataset
</commit_message>
<xml_diff>
--- a/Research question/Ds115 Team Research.pptx
+++ b/Research question/Ds115 Team Research.pptx
@@ -5399,11 +5399,11 @@
                   </a:schemeClr>
                 </a:solidFill>
               </a:rPr>
-              <a:t>domestic flights departing from Delhi </a:t>
+              <a:t>domestic flights </a:t>
             </a:r>
             <a:r>
               <a:rPr lang="en-US" sz="3600" dirty="0"/>
-              <a:t>in India? .</a:t>
+              <a:t>in India?.</a:t>
             </a:r>
             <a:br>
               <a:rPr lang="en-US" sz="3600" dirty="0"/>
@@ -5625,7 +5625,7 @@
                 </a:solidFill>
                 <a:latin typeface="+mn-lt"/>
               </a:rPr>
-              <a:t> for domestic flights departing from Delhi in India</a:t>
+              <a:t> for domestic flights departing in India</a:t>
             </a:r>
             <a:r>
               <a:rPr lang="en-US" sz="2400" b="0" spc="0" dirty="0">
@@ -5749,7 +5749,7 @@
                 </a:solidFill>
                 <a:latin typeface="+mn-lt"/>
               </a:rPr>
-              <a:t>for domestic flights departing from Delhi in India.</a:t>
+              <a:t>for domestic flights in India.</a:t>
             </a:r>
             <a:endParaRPr lang="en-US" sz="2400" b="0" spc="0" dirty="0">
               <a:solidFill>
@@ -7117,20 +7117,20 @@
 </file>
 
 <file path=customXml/item2.xml><?xml version="1.0" encoding="utf-8"?>
+<p:properties xmlns:p="http://schemas.microsoft.com/office/2006/metadata/properties" xmlns:xsi="http://www.w3.org/2001/XMLSchema-instance" xmlns:pc="http://schemas.microsoft.com/office/infopath/2007/PartnerControls">
+  <documentManagement>
+    <_activity xmlns="e0b66e2b-8ac0-4af7-b642-ec91160566fb" xsi:nil="true"/>
+  </documentManagement>
+</p:properties>
+</file>
+
+<file path=customXml/item3.xml><?xml version="1.0" encoding="utf-8"?>
 <?mso-contentType ?>
 <FormTemplates xmlns="http://schemas.microsoft.com/sharepoint/v3/contenttype/forms">
   <Display>DocumentLibraryForm</Display>
   <Edit>DocumentLibraryForm</Edit>
   <New>DocumentLibraryForm</New>
 </FormTemplates>
-</file>
-
-<file path=customXml/item3.xml><?xml version="1.0" encoding="utf-8"?>
-<p:properties xmlns:p="http://schemas.microsoft.com/office/2006/metadata/properties" xmlns:xsi="http://www.w3.org/2001/XMLSchema-instance" xmlns:pc="http://schemas.microsoft.com/office/infopath/2007/PartnerControls">
-  <documentManagement>
-    <_activity xmlns="e0b66e2b-8ac0-4af7-b642-ec91160566fb" xsi:nil="true"/>
-  </documentManagement>
-</p:properties>
 </file>
 
 <file path=customXml/itemProps1.xml><?xml version="1.0" encoding="utf-8"?>
@@ -7152,14 +7152,6 @@
 </file>
 
 <file path=customXml/itemProps2.xml><?xml version="1.0" encoding="utf-8"?>
-<ds:datastoreItem xmlns:ds="http://schemas.openxmlformats.org/officeDocument/2006/customXml" ds:itemID="{91C521DD-2673-4EE6-BB9B-DC5C3320FFBB}">
-  <ds:schemaRefs>
-    <ds:schemaRef ds:uri="http://schemas.microsoft.com/sharepoint/v3/contenttype/forms"/>
-  </ds:schemaRefs>
-</ds:datastoreItem>
-</file>
-
-<file path=customXml/itemProps3.xml><?xml version="1.0" encoding="utf-8"?>
 <ds:datastoreItem xmlns:ds="http://schemas.openxmlformats.org/officeDocument/2006/customXml" ds:itemID="{EDD1FC41-23C7-41B0-B5F9-BF4CD38AD2ED}">
   <ds:schemaRefs>
     <ds:schemaRef ds:uri="http://schemas.microsoft.com/office/infopath/2007/PartnerControls"/>
@@ -7173,4 +7165,12 @@
     <ds:schemaRef ds:uri="http://www.w3.org/XML/1998/namespace"/>
   </ds:schemaRefs>
 </ds:datastoreItem>
+</file>
+
+<file path=customXml/itemProps3.xml><?xml version="1.0" encoding="utf-8"?>
+<ds:datastoreItem xmlns:ds="http://schemas.openxmlformats.org/officeDocument/2006/customXml" ds:itemID="{91C521DD-2673-4EE6-BB9B-DC5C3320FFBB}">
+  <ds:schemaRefs>
+    <ds:schemaRef ds:uri="http://schemas.microsoft.com/sharepoint/v3/contenttype/forms"/>
+  </ds:schemaRefs>
+</ds:datastoreItem>
 </file>
</xml_diff>